<commit_message>
Final U of Ark Lunch and Learn. Had to update one slide and added the pdf version.
</commit_message>
<xml_diff>
--- a/201111 2020 - Is Analytics in Professional Sports Making a Difference - U of Ark.pptx
+++ b/201111 2020 - Is Analytics in Professional Sports Making a Difference - U of Ark.pptx
@@ -242,7 +242,7 @@
           <a:p>
             <a:fld id="{726F62DA-8226-40BB-A178-84CAFB4DB1C7}" type="datetimeFigureOut">
               <a:rPr lang="en-US" smtClean="0"/>
-              <a:t>11/10/2020</a:t>
+              <a:t>11/12/2020</a:t>
             </a:fld>
             <a:endParaRPr lang="en-US"/>
           </a:p>
@@ -33164,14 +33164,15 @@
         <p:spPr/>
         <p:txBody>
           <a:bodyPr>
-            <a:normAutofit/>
+            <a:normAutofit fontScale="90000"/>
           </a:bodyPr>
           <a:lstStyle/>
           <a:p>
             <a:r>
-              <a:rPr lang="en-US" sz="3600" dirty="0"/>
-              <a:t>MSOM Programs</a:t>
+              <a:rPr lang="en-US" sz="3600"/>
+              <a:t>College of Engineering &amp; Industrial Engineering Programs</a:t>
             </a:r>
+            <a:endParaRPr lang="en-US" sz="3600" dirty="0"/>
           </a:p>
         </p:txBody>
       </p:sp>
@@ -40945,7 +40946,7 @@
                           <a:latin typeface="Roboto"/>
                           <a:cs typeface="Roboto"/>
                         </a:rPr>
-                        <a:t>93</a:t>
+                        <a:t>30</a:t>
                       </a:r>
                     </a:p>
                   </a:txBody>
@@ -41016,7 +41017,7 @@
                           <a:latin typeface="Roboto"/>
                           <a:cs typeface="Roboto"/>
                         </a:rPr>
-                        <a:t>0.7</a:t>
+                        <a:t>1.5</a:t>
                       </a:r>
                     </a:p>
                   </a:txBody>
@@ -41087,7 +41088,7 @@
                           <a:latin typeface="Roboto"/>
                           <a:cs typeface="Roboto"/>
                         </a:rPr>
-                        <a:t>0.6</a:t>
+                        <a:t>1.9</a:t>
                       </a:r>
                     </a:p>
                   </a:txBody>
@@ -41158,7 +41159,7 @@
                           <a:latin typeface="Roboto"/>
                           <a:cs typeface="Roboto"/>
                         </a:rPr>
-                        <a:t>0.4</a:t>
+                        <a:t>2.4</a:t>
                       </a:r>
                     </a:p>
                   </a:txBody>
@@ -41229,7 +41230,7 @@
                           <a:latin typeface="Roboto"/>
                           <a:cs typeface="Roboto"/>
                         </a:rPr>
-                        <a:t>0.4</a:t>
+                        <a:t>2.5</a:t>
                       </a:r>
                     </a:p>
                   </a:txBody>
@@ -41300,7 +41301,7 @@
                           <a:latin typeface="Roboto"/>
                           <a:cs typeface="Roboto"/>
                         </a:rPr>
-                        <a:t>0.6</a:t>
+                        <a:t>2.1</a:t>
                       </a:r>
                     </a:p>
                   </a:txBody>
@@ -41371,7 +41372,7 @@
                           <a:latin typeface="Roboto"/>
                           <a:cs typeface="Roboto"/>
                         </a:rPr>
-                        <a:t>0.7</a:t>
+                        <a:t>1.5</a:t>
                       </a:r>
                     </a:p>
                   </a:txBody>
@@ -41442,7 +41443,7 @@
                           <a:latin typeface="Roboto"/>
                           <a:cs typeface="Roboto"/>
                         </a:rPr>
-                        <a:t>1.7</a:t>
+                        <a:t>1.6</a:t>
                       </a:r>
                     </a:p>
                   </a:txBody>
@@ -41513,7 +41514,7 @@
                           <a:latin typeface="Roboto"/>
                           <a:cs typeface="Roboto"/>
                         </a:rPr>
-                        <a:t>16.9</a:t>
+                        <a:t>12.7</a:t>
                       </a:r>
                     </a:p>
                   </a:txBody>
@@ -41584,7 +41585,7 @@
                           <a:latin typeface="Roboto"/>
                           <a:cs typeface="Roboto"/>
                         </a:rPr>
-                        <a:t>2.9</a:t>
+                        <a:t>4.0</a:t>
                       </a:r>
                     </a:p>
                   </a:txBody>
@@ -41728,7 +41729,7 @@
                           <a:latin typeface="Roboto"/>
                           <a:cs typeface="Roboto"/>
                         </a:rPr>
-                        <a:t>30</a:t>
+                        <a:t>93</a:t>
                       </a:r>
                     </a:p>
                   </a:txBody>
@@ -41799,7 +41800,7 @@
                           <a:latin typeface="Roboto"/>
                           <a:cs typeface="Roboto"/>
                         </a:rPr>
-                        <a:t>1.5</a:t>
+                        <a:t>0.7</a:t>
                       </a:r>
                     </a:p>
                   </a:txBody>
@@ -41870,7 +41871,7 @@
                           <a:latin typeface="Roboto"/>
                           <a:cs typeface="Roboto"/>
                         </a:rPr>
-                        <a:t>1.9</a:t>
+                        <a:t>0.6</a:t>
                       </a:r>
                     </a:p>
                   </a:txBody>
@@ -41941,7 +41942,7 @@
                           <a:latin typeface="Roboto"/>
                           <a:cs typeface="Roboto"/>
                         </a:rPr>
-                        <a:t>2.4</a:t>
+                        <a:t>0.4</a:t>
                       </a:r>
                     </a:p>
                   </a:txBody>
@@ -42012,7 +42013,7 @@
                           <a:latin typeface="Roboto"/>
                           <a:cs typeface="Roboto"/>
                         </a:rPr>
-                        <a:t>2.5</a:t>
+                        <a:t>0.4</a:t>
                       </a:r>
                     </a:p>
                   </a:txBody>
@@ -42083,7 +42084,7 @@
                           <a:latin typeface="Roboto"/>
                           <a:cs typeface="Roboto"/>
                         </a:rPr>
-                        <a:t>2.1</a:t>
+                        <a:t>0.6</a:t>
                       </a:r>
                     </a:p>
                   </a:txBody>
@@ -42154,7 +42155,7 @@
                           <a:latin typeface="Roboto"/>
                           <a:cs typeface="Roboto"/>
                         </a:rPr>
-                        <a:t>1.5</a:t>
+                        <a:t>0.7</a:t>
                       </a:r>
                     </a:p>
                   </a:txBody>
@@ -42225,7 +42226,7 @@
                           <a:latin typeface="Roboto"/>
                           <a:cs typeface="Roboto"/>
                         </a:rPr>
-                        <a:t>1.6</a:t>
+                        <a:t>1.7</a:t>
                       </a:r>
                     </a:p>
                   </a:txBody>
@@ -42296,7 +42297,7 @@
                           <a:latin typeface="Roboto"/>
                           <a:cs typeface="Roboto"/>
                         </a:rPr>
-                        <a:t>12.7</a:t>
+                        <a:t>16.9</a:t>
                       </a:r>
                     </a:p>
                   </a:txBody>
@@ -42367,7 +42368,7 @@
                           <a:latin typeface="Roboto"/>
                           <a:cs typeface="Roboto"/>
                         </a:rPr>
-                        <a:t>4.0</a:t>
+                        <a:t>2.9</a:t>
                       </a:r>
                     </a:p>
                   </a:txBody>

</xml_diff>